<commit_message>
Diagramme und 4. (erklärung des Gesamt-Quellcodes) ist fertig
</commit_message>
<xml_diff>
--- a/Beleg/UML-IR_Remote.pptx
+++ b/Beleg/UML-IR_Remote.pptx
@@ -262,7 +262,7 @@
           <a:p>
             <a:fld id="{DCFA11AF-D567-4408-8BA5-866BEB2B0871}" type="datetimeFigureOut">
               <a:rPr lang="de-DE" smtClean="0"/>
-              <a:t>21.02.2024</a:t>
+              <a:t>26.02.2024</a:t>
             </a:fld>
             <a:endParaRPr lang="de-DE"/>
           </a:p>
@@ -460,7 +460,7 @@
           <a:p>
             <a:fld id="{DCFA11AF-D567-4408-8BA5-866BEB2B0871}" type="datetimeFigureOut">
               <a:rPr lang="de-DE" smtClean="0"/>
-              <a:t>21.02.2024</a:t>
+              <a:t>26.02.2024</a:t>
             </a:fld>
             <a:endParaRPr lang="de-DE"/>
           </a:p>
@@ -668,7 +668,7 @@
           <a:p>
             <a:fld id="{DCFA11AF-D567-4408-8BA5-866BEB2B0871}" type="datetimeFigureOut">
               <a:rPr lang="de-DE" smtClean="0"/>
-              <a:t>21.02.2024</a:t>
+              <a:t>26.02.2024</a:t>
             </a:fld>
             <a:endParaRPr lang="de-DE"/>
           </a:p>
@@ -866,7 +866,7 @@
           <a:p>
             <a:fld id="{DCFA11AF-D567-4408-8BA5-866BEB2B0871}" type="datetimeFigureOut">
               <a:rPr lang="de-DE" smtClean="0"/>
-              <a:t>21.02.2024</a:t>
+              <a:t>26.02.2024</a:t>
             </a:fld>
             <a:endParaRPr lang="de-DE"/>
           </a:p>
@@ -1141,7 +1141,7 @@
           <a:p>
             <a:fld id="{DCFA11AF-D567-4408-8BA5-866BEB2B0871}" type="datetimeFigureOut">
               <a:rPr lang="de-DE" smtClean="0"/>
-              <a:t>21.02.2024</a:t>
+              <a:t>26.02.2024</a:t>
             </a:fld>
             <a:endParaRPr lang="de-DE"/>
           </a:p>
@@ -1406,7 +1406,7 @@
           <a:p>
             <a:fld id="{DCFA11AF-D567-4408-8BA5-866BEB2B0871}" type="datetimeFigureOut">
               <a:rPr lang="de-DE" smtClean="0"/>
-              <a:t>21.02.2024</a:t>
+              <a:t>26.02.2024</a:t>
             </a:fld>
             <a:endParaRPr lang="de-DE"/>
           </a:p>
@@ -1818,7 +1818,7 @@
           <a:p>
             <a:fld id="{DCFA11AF-D567-4408-8BA5-866BEB2B0871}" type="datetimeFigureOut">
               <a:rPr lang="de-DE" smtClean="0"/>
-              <a:t>21.02.2024</a:t>
+              <a:t>26.02.2024</a:t>
             </a:fld>
             <a:endParaRPr lang="de-DE"/>
           </a:p>
@@ -1959,7 +1959,7 @@
           <a:p>
             <a:fld id="{DCFA11AF-D567-4408-8BA5-866BEB2B0871}" type="datetimeFigureOut">
               <a:rPr lang="de-DE" smtClean="0"/>
-              <a:t>21.02.2024</a:t>
+              <a:t>26.02.2024</a:t>
             </a:fld>
             <a:endParaRPr lang="de-DE"/>
           </a:p>
@@ -2072,7 +2072,7 @@
           <a:p>
             <a:fld id="{DCFA11AF-D567-4408-8BA5-866BEB2B0871}" type="datetimeFigureOut">
               <a:rPr lang="de-DE" smtClean="0"/>
-              <a:t>21.02.2024</a:t>
+              <a:t>26.02.2024</a:t>
             </a:fld>
             <a:endParaRPr lang="de-DE"/>
           </a:p>
@@ -2383,7 +2383,7 @@
           <a:p>
             <a:fld id="{DCFA11AF-D567-4408-8BA5-866BEB2B0871}" type="datetimeFigureOut">
               <a:rPr lang="de-DE" smtClean="0"/>
-              <a:t>21.02.2024</a:t>
+              <a:t>26.02.2024</a:t>
             </a:fld>
             <a:endParaRPr lang="de-DE"/>
           </a:p>
@@ -2671,7 +2671,7 @@
           <a:p>
             <a:fld id="{DCFA11AF-D567-4408-8BA5-866BEB2B0871}" type="datetimeFigureOut">
               <a:rPr lang="de-DE" smtClean="0"/>
-              <a:t>21.02.2024</a:t>
+              <a:t>26.02.2024</a:t>
             </a:fld>
             <a:endParaRPr lang="de-DE"/>
           </a:p>
@@ -2912,7 +2912,7 @@
           <a:p>
             <a:fld id="{DCFA11AF-D567-4408-8BA5-866BEB2B0871}" type="datetimeFigureOut">
               <a:rPr lang="de-DE" smtClean="0"/>
-              <a:t>21.02.2024</a:t>
+              <a:t>26.02.2024</a:t>
             </a:fld>
             <a:endParaRPr lang="de-DE"/>
           </a:p>
@@ -3546,7 +3546,7 @@
         </p:nvGrpSpPr>
         <p:grpSpPr>
           <a:xfrm>
-            <a:off x="3281901" y="5781893"/>
+            <a:off x="228690" y="4310936"/>
             <a:ext cx="2386062" cy="817510"/>
             <a:chOff x="4712295" y="2548166"/>
             <a:chExt cx="2386062" cy="817510"/>
@@ -3756,7 +3756,7 @@
         </p:nvGrpSpPr>
         <p:grpSpPr>
           <a:xfrm>
-            <a:off x="8649065" y="602893"/>
+            <a:off x="3936544" y="4154292"/>
             <a:ext cx="2542747" cy="2543630"/>
             <a:chOff x="3079582" y="173924"/>
             <a:chExt cx="1324415" cy="2442070"/>
@@ -4067,7 +4067,7 @@
         </p:nvGrpSpPr>
         <p:grpSpPr>
           <a:xfrm>
-            <a:off x="9640093" y="5091449"/>
+            <a:off x="246357" y="1100846"/>
             <a:ext cx="1915152" cy="1502186"/>
             <a:chOff x="537536" y="2626521"/>
             <a:chExt cx="1915152" cy="1502186"/>
@@ -4191,6 +4191,26 @@
                 </a:rPr>
                 <a:t>IRrecv</a:t>
               </a:r>
+              <a:r>
+                <a:rPr lang="de-DE" sz="2000" dirty="0">
+                  <a:solidFill>
+                    <a:schemeClr val="tx1"/>
+                  </a:solidFill>
+                  <a:latin typeface="Arial" panose="020B0604020202020204" pitchFamily="34" charset="0"/>
+                  <a:cs typeface="Arial" panose="020B0604020202020204" pitchFamily="34" charset="0"/>
+                </a:rPr>
+                <a:t>: IR-</a:t>
+              </a:r>
+              <a:r>
+                <a:rPr lang="de-DE" sz="2000" dirty="0" err="1">
+                  <a:solidFill>
+                    <a:schemeClr val="tx1"/>
+                  </a:solidFill>
+                  <a:latin typeface="Arial" panose="020B0604020202020204" pitchFamily="34" charset="0"/>
+                  <a:cs typeface="Arial" panose="020B0604020202020204" pitchFamily="34" charset="0"/>
+                </a:rPr>
+                <a:t>Lib</a:t>
+              </a:r>
               <a:endParaRPr lang="de-DE" sz="2000" dirty="0">
                 <a:solidFill>
                   <a:schemeClr val="tx1"/>
@@ -4209,6 +4229,26 @@
                   <a:cs typeface="Arial" panose="020B0604020202020204" pitchFamily="34" charset="0"/>
                 </a:rPr>
                 <a:t>IRsend</a:t>
+              </a:r>
+              <a:r>
+                <a:rPr lang="de-DE" sz="2000" dirty="0">
+                  <a:solidFill>
+                    <a:schemeClr val="tx1"/>
+                  </a:solidFill>
+                  <a:latin typeface="Arial" panose="020B0604020202020204" pitchFamily="34" charset="0"/>
+                  <a:cs typeface="Arial" panose="020B0604020202020204" pitchFamily="34" charset="0"/>
+                </a:rPr>
+                <a:t>: IR-</a:t>
+              </a:r>
+              <a:r>
+                <a:rPr lang="de-DE" sz="2000" dirty="0" err="1">
+                  <a:solidFill>
+                    <a:schemeClr val="tx1"/>
+                  </a:solidFill>
+                  <a:latin typeface="Arial" panose="020B0604020202020204" pitchFamily="34" charset="0"/>
+                  <a:cs typeface="Arial" panose="020B0604020202020204" pitchFamily="34" charset="0"/>
+                </a:rPr>
+                <a:t>Lib</a:t>
               </a:r>
               <a:endParaRPr lang="de-DE" sz="2000" dirty="0">
                 <a:solidFill>
@@ -4317,7 +4357,7 @@
         </p:nvGrpSpPr>
         <p:grpSpPr>
           <a:xfrm>
-            <a:off x="146359" y="1573151"/>
+            <a:off x="6282650" y="156633"/>
             <a:ext cx="2611545" cy="3711697"/>
             <a:chOff x="4993370" y="5174572"/>
             <a:chExt cx="2611545" cy="3134694"/>
@@ -4372,22 +4412,15 @@
             <a:p>
               <a:pPr algn="ctr"/>
               <a:r>
-                <a:rPr lang="de-DE" sz="2000" b="1" dirty="0" err="1">
+                <a:rPr lang="de-DE" sz="2000" b="1" dirty="0">
                   <a:solidFill>
                     <a:schemeClr val="tx1"/>
                   </a:solidFill>
                   <a:latin typeface="Arial" panose="020B0604020202020204" pitchFamily="34" charset="0"/>
                   <a:cs typeface="Arial" panose="020B0604020202020204" pitchFamily="34" charset="0"/>
                 </a:rPr>
-                <a:t>Base_system</a:t>
+                <a:t>Hauptsystem</a:t>
               </a:r>
-              <a:endParaRPr lang="de-DE" sz="2000" b="1" dirty="0">
-                <a:solidFill>
-                  <a:schemeClr val="tx1"/>
-                </a:solidFill>
-                <a:latin typeface="Arial" panose="020B0604020202020204" pitchFamily="34" charset="0"/>
-                <a:cs typeface="Arial" panose="020B0604020202020204" pitchFamily="34" charset="0"/>
-              </a:endParaRPr>
             </a:p>
           </p:txBody>
         </p:sp>
@@ -4682,8 +4715,8 @@
         </p:nvGrpSpPr>
         <p:grpSpPr>
           <a:xfrm>
-            <a:off x="4223607" y="360172"/>
-            <a:ext cx="2485062" cy="2581383"/>
+            <a:off x="7750665" y="3997123"/>
+            <a:ext cx="4089535" cy="2581383"/>
             <a:chOff x="9169401" y="2754394"/>
             <a:chExt cx="2485062" cy="2581383"/>
           </a:xfrm>
@@ -4806,13 +4839,16 @@
                 </a:rPr>
                 <a:t>Get_Entry</a:t>
               </a:r>
-              <a:endParaRPr lang="de-DE" sz="2000" dirty="0">
-                <a:solidFill>
-                  <a:schemeClr val="tx1"/>
-                </a:solidFill>
-                <a:latin typeface="Arial" panose="020B0604020202020204" pitchFamily="34" charset="0"/>
-                <a:cs typeface="Arial" panose="020B0604020202020204" pitchFamily="34" charset="0"/>
-              </a:endParaRPr>
+              <a:r>
+                <a:rPr lang="de-DE" sz="2000" dirty="0">
+                  <a:solidFill>
+                    <a:schemeClr val="tx1"/>
+                  </a:solidFill>
+                  <a:latin typeface="Arial" panose="020B0604020202020204" pitchFamily="34" charset="0"/>
+                  <a:cs typeface="Arial" panose="020B0604020202020204" pitchFamily="34" charset="0"/>
+                </a:rPr>
+                <a:t>()</a:t>
+              </a:r>
             </a:p>
             <a:p>
               <a:r>
@@ -4825,13 +4861,16 @@
                 </a:rPr>
                 <a:t>Manipulate_Entry</a:t>
               </a:r>
-              <a:endParaRPr lang="de-DE" sz="2000" dirty="0">
-                <a:solidFill>
-                  <a:schemeClr val="tx1"/>
-                </a:solidFill>
-                <a:latin typeface="Arial" panose="020B0604020202020204" pitchFamily="34" charset="0"/>
-                <a:cs typeface="Arial" panose="020B0604020202020204" pitchFamily="34" charset="0"/>
-              </a:endParaRPr>
+              <a:r>
+                <a:rPr lang="de-DE" sz="2000" dirty="0">
+                  <a:solidFill>
+                    <a:schemeClr val="tx1"/>
+                  </a:solidFill>
+                  <a:latin typeface="Arial" panose="020B0604020202020204" pitchFamily="34" charset="0"/>
+                  <a:cs typeface="Arial" panose="020B0604020202020204" pitchFamily="34" charset="0"/>
+                </a:rPr>
+                <a:t>()</a:t>
+              </a:r>
             </a:p>
             <a:p>
               <a:r>
@@ -4844,13 +4883,16 @@
                 </a:rPr>
                 <a:t>Check_Index</a:t>
               </a:r>
-              <a:endParaRPr lang="de-DE" sz="2000" dirty="0">
-                <a:solidFill>
-                  <a:schemeClr val="tx1"/>
-                </a:solidFill>
-                <a:latin typeface="Arial" panose="020B0604020202020204" pitchFamily="34" charset="0"/>
-                <a:cs typeface="Arial" panose="020B0604020202020204" pitchFamily="34" charset="0"/>
-              </a:endParaRPr>
+              <a:r>
+                <a:rPr lang="de-DE" sz="2000" dirty="0">
+                  <a:solidFill>
+                    <a:schemeClr val="tx1"/>
+                  </a:solidFill>
+                  <a:latin typeface="Arial" panose="020B0604020202020204" pitchFamily="34" charset="0"/>
+                  <a:cs typeface="Arial" panose="020B0604020202020204" pitchFamily="34" charset="0"/>
+                </a:rPr>
+                <a:t>()</a:t>
+              </a:r>
             </a:p>
           </p:txBody>
         </p:sp>
@@ -4911,13 +4953,36 @@
                 </a:rPr>
                 <a:t>Start_Menü</a:t>
               </a:r>
-              <a:endParaRPr lang="de-DE" sz="2000" dirty="0">
-                <a:solidFill>
-                  <a:schemeClr val="tx1"/>
-                </a:solidFill>
-                <a:latin typeface="Arial" panose="020B0604020202020204" pitchFamily="34" charset="0"/>
-                <a:cs typeface="Arial" panose="020B0604020202020204" pitchFamily="34" charset="0"/>
-              </a:endParaRPr>
+              <a:r>
+                <a:rPr lang="de-DE" sz="2000" dirty="0">
+                  <a:solidFill>
+                    <a:schemeClr val="tx1"/>
+                  </a:solidFill>
+                  <a:latin typeface="Arial" panose="020B0604020202020204" pitchFamily="34" charset="0"/>
+                  <a:cs typeface="Arial" panose="020B0604020202020204" pitchFamily="34" charset="0"/>
+                </a:rPr>
+                <a:t>: </a:t>
+              </a:r>
+              <a:r>
+                <a:rPr lang="de-DE" sz="2000" dirty="0" err="1">
+                  <a:solidFill>
+                    <a:schemeClr val="tx1"/>
+                  </a:solidFill>
+                  <a:latin typeface="Arial" panose="020B0604020202020204" pitchFamily="34" charset="0"/>
+                  <a:cs typeface="Arial" panose="020B0604020202020204" pitchFamily="34" charset="0"/>
+                </a:rPr>
+                <a:t>Menü_Eintrag</a:t>
+              </a:r>
+              <a:r>
+                <a:rPr lang="de-DE" sz="2000" dirty="0">
+                  <a:solidFill>
+                    <a:schemeClr val="tx1"/>
+                  </a:solidFill>
+                  <a:latin typeface="Arial" panose="020B0604020202020204" pitchFamily="34" charset="0"/>
+                  <a:cs typeface="Arial" panose="020B0604020202020204" pitchFamily="34" charset="0"/>
+                </a:rPr>
+                <a:t> []</a:t>
+              </a:r>
             </a:p>
             <a:p>
               <a:r>
@@ -4930,13 +4995,36 @@
                 </a:rPr>
                 <a:t>Send_Menü</a:t>
               </a:r>
-              <a:endParaRPr lang="de-DE" sz="2000" dirty="0">
-                <a:solidFill>
-                  <a:schemeClr val="tx1"/>
-                </a:solidFill>
-                <a:latin typeface="Arial" panose="020B0604020202020204" pitchFamily="34" charset="0"/>
-                <a:cs typeface="Arial" panose="020B0604020202020204" pitchFamily="34" charset="0"/>
-              </a:endParaRPr>
+              <a:r>
+                <a:rPr lang="de-DE" sz="2000" dirty="0">
+                  <a:solidFill>
+                    <a:schemeClr val="tx1"/>
+                  </a:solidFill>
+                  <a:latin typeface="Arial" panose="020B0604020202020204" pitchFamily="34" charset="0"/>
+                  <a:cs typeface="Arial" panose="020B0604020202020204" pitchFamily="34" charset="0"/>
+                </a:rPr>
+                <a:t>: </a:t>
+              </a:r>
+              <a:r>
+                <a:rPr lang="de-DE" sz="2000" dirty="0" err="1">
+                  <a:solidFill>
+                    <a:schemeClr val="tx1"/>
+                  </a:solidFill>
+                  <a:latin typeface="Arial" panose="020B0604020202020204" pitchFamily="34" charset="0"/>
+                  <a:cs typeface="Arial" panose="020B0604020202020204" pitchFamily="34" charset="0"/>
+                </a:rPr>
+                <a:t>Menü_Eintrag</a:t>
+              </a:r>
+              <a:r>
+                <a:rPr lang="de-DE" sz="2000" dirty="0">
+                  <a:solidFill>
+                    <a:schemeClr val="tx1"/>
+                  </a:solidFill>
+                  <a:latin typeface="Arial" panose="020B0604020202020204" pitchFamily="34" charset="0"/>
+                  <a:cs typeface="Arial" panose="020B0604020202020204" pitchFamily="34" charset="0"/>
+                </a:rPr>
+                <a:t> []</a:t>
+              </a:r>
             </a:p>
             <a:p>
               <a:r>
@@ -4949,13 +5037,36 @@
                 </a:rPr>
                 <a:t>Receive_Menü</a:t>
               </a:r>
-              <a:endParaRPr lang="de-DE" sz="2000" dirty="0">
-                <a:solidFill>
-                  <a:schemeClr val="tx1"/>
-                </a:solidFill>
-                <a:latin typeface="Arial" panose="020B0604020202020204" pitchFamily="34" charset="0"/>
-                <a:cs typeface="Arial" panose="020B0604020202020204" pitchFamily="34" charset="0"/>
-              </a:endParaRPr>
+              <a:r>
+                <a:rPr lang="de-DE" sz="2000" dirty="0">
+                  <a:solidFill>
+                    <a:schemeClr val="tx1"/>
+                  </a:solidFill>
+                  <a:latin typeface="Arial" panose="020B0604020202020204" pitchFamily="34" charset="0"/>
+                  <a:cs typeface="Arial" panose="020B0604020202020204" pitchFamily="34" charset="0"/>
+                </a:rPr>
+                <a:t>: </a:t>
+              </a:r>
+              <a:r>
+                <a:rPr lang="de-DE" sz="2000" dirty="0" err="1">
+                  <a:solidFill>
+                    <a:schemeClr val="tx1"/>
+                  </a:solidFill>
+                  <a:latin typeface="Arial" panose="020B0604020202020204" pitchFamily="34" charset="0"/>
+                  <a:cs typeface="Arial" panose="020B0604020202020204" pitchFamily="34" charset="0"/>
+                </a:rPr>
+                <a:t>Menü_Eintrag</a:t>
+              </a:r>
+              <a:r>
+                <a:rPr lang="de-DE" sz="2000" dirty="0">
+                  <a:solidFill>
+                    <a:schemeClr val="tx1"/>
+                  </a:solidFill>
+                  <a:latin typeface="Arial" panose="020B0604020202020204" pitchFamily="34" charset="0"/>
+                  <a:cs typeface="Arial" panose="020B0604020202020204" pitchFamily="34" charset="0"/>
+                </a:rPr>
+                <a:t> []</a:t>
+              </a:r>
             </a:p>
             <a:p>
               <a:r>
@@ -4968,13 +5079,36 @@
                 </a:rPr>
                 <a:t>Greetings_Menü</a:t>
               </a:r>
-              <a:endParaRPr lang="de-DE" sz="2000" dirty="0">
-                <a:solidFill>
-                  <a:schemeClr val="tx1"/>
-                </a:solidFill>
-                <a:latin typeface="Arial" panose="020B0604020202020204" pitchFamily="34" charset="0"/>
-                <a:cs typeface="Arial" panose="020B0604020202020204" pitchFamily="34" charset="0"/>
-              </a:endParaRPr>
+              <a:r>
+                <a:rPr lang="de-DE" sz="2000" dirty="0">
+                  <a:solidFill>
+                    <a:schemeClr val="tx1"/>
+                  </a:solidFill>
+                  <a:latin typeface="Arial" panose="020B0604020202020204" pitchFamily="34" charset="0"/>
+                  <a:cs typeface="Arial" panose="020B0604020202020204" pitchFamily="34" charset="0"/>
+                </a:rPr>
+                <a:t>: </a:t>
+              </a:r>
+              <a:r>
+                <a:rPr lang="de-DE" sz="2000" dirty="0" err="1">
+                  <a:solidFill>
+                    <a:schemeClr val="tx1"/>
+                  </a:solidFill>
+                  <a:latin typeface="Arial" panose="020B0604020202020204" pitchFamily="34" charset="0"/>
+                  <a:cs typeface="Arial" panose="020B0604020202020204" pitchFamily="34" charset="0"/>
+                </a:rPr>
+                <a:t>Menü_Eintrag</a:t>
+              </a:r>
+              <a:r>
+                <a:rPr lang="de-DE" sz="2000" dirty="0">
+                  <a:solidFill>
+                    <a:schemeClr val="tx1"/>
+                  </a:solidFill>
+                  <a:latin typeface="Arial" panose="020B0604020202020204" pitchFamily="34" charset="0"/>
+                  <a:cs typeface="Arial" panose="020B0604020202020204" pitchFamily="34" charset="0"/>
+                </a:rPr>
+                <a:t> []</a:t>
+              </a:r>
             </a:p>
           </p:txBody>
         </p:sp>
@@ -4993,10 +5127,10 @@
         </p:nvGrpSpPr>
         <p:grpSpPr>
           <a:xfrm>
-            <a:off x="6753865" y="5698254"/>
-            <a:ext cx="1800327" cy="890619"/>
+            <a:off x="228690" y="3009688"/>
+            <a:ext cx="1800327" cy="888238"/>
             <a:chOff x="7788005" y="215404"/>
-            <a:chExt cx="1381395" cy="890619"/>
+            <a:chExt cx="1381395" cy="888238"/>
           </a:xfrm>
         </p:grpSpPr>
         <p:sp>
@@ -5131,7 +5265,7 @@
           </p:nvSpPr>
           <p:spPr>
             <a:xfrm>
-              <a:off x="7788005" y="681083"/>
+              <a:off x="7788005" y="678702"/>
               <a:ext cx="1381395" cy="424940"/>
             </a:xfrm>
             <a:prstGeom prst="rect">
@@ -5178,53 +5312,6 @@
           </p:txBody>
         </p:sp>
       </p:grpSp>
-      <p:cxnSp>
-        <p:nvCxnSpPr>
-          <p:cNvPr id="40" name="Gerade Verbindung mit Pfeil 39">
-            <a:extLst>
-              <a:ext uri="{FF2B5EF4-FFF2-40B4-BE49-F238E27FC236}">
-                <a16:creationId xmlns:a16="http://schemas.microsoft.com/office/drawing/2014/main" id="{15C2988C-0A79-A84B-5F96-5510224D3DF9}"/>
-              </a:ext>
-            </a:extLst>
-          </p:cNvPr>
-          <p:cNvCxnSpPr>
-            <a:cxnSpLocks/>
-          </p:cNvCxnSpPr>
-          <p:nvPr/>
-        </p:nvCxnSpPr>
-        <p:spPr>
-          <a:xfrm>
-            <a:off x="2895959" y="797249"/>
-            <a:ext cx="854847" cy="0"/>
-          </a:xfrm>
-          <a:prstGeom prst="straightConnector1">
-            <a:avLst/>
-          </a:prstGeom>
-          <a:ln w="19050" cap="flat" cmpd="sng" algn="ctr">
-            <a:solidFill>
-              <a:schemeClr val="dk1"/>
-            </a:solidFill>
-            <a:prstDash val="solid"/>
-            <a:round/>
-            <a:headEnd type="none" w="med" len="med"/>
-            <a:tailEnd type="arrow" w="med" len="lg"/>
-          </a:ln>
-        </p:spPr>
-        <p:style>
-          <a:lnRef idx="0">
-            <a:scrgbClr r="0" g="0" b="0"/>
-          </a:lnRef>
-          <a:fillRef idx="0">
-            <a:scrgbClr r="0" g="0" b="0"/>
-          </a:fillRef>
-          <a:effectRef idx="0">
-            <a:scrgbClr r="0" g="0" b="0"/>
-          </a:effectRef>
-          <a:fontRef idx="minor">
-            <a:schemeClr val="tx1"/>
-          </a:fontRef>
-        </p:style>
-      </p:cxnSp>
       <p:sp>
         <p:nvSpPr>
           <p:cNvPr id="47" name="Gleichschenkliges Dreieck 46">
@@ -5277,65 +5364,6 @@
       </p:sp>
       <p:sp>
         <p:nvSpPr>
-          <p:cNvPr id="48" name="Gleichschenkliges Dreieck 47">
-            <a:extLst>
-              <a:ext uri="{FF2B5EF4-FFF2-40B4-BE49-F238E27FC236}">
-                <a16:creationId xmlns:a16="http://schemas.microsoft.com/office/drawing/2014/main" id="{D199B4D6-5712-4E16-B61B-EF0E6569AE75}"/>
-              </a:ext>
-            </a:extLst>
-          </p:cNvPr>
-          <p:cNvSpPr/>
-          <p:nvPr/>
-        </p:nvSpPr>
-        <p:spPr>
-          <a:xfrm>
-            <a:off x="3023202" y="16030"/>
-            <a:ext cx="371475" cy="312498"/>
-          </a:xfrm>
-          <a:prstGeom prst="triangle">
-            <a:avLst/>
-          </a:prstGeom>
-          <a:solidFill>
-            <a:schemeClr val="tx2">
-              <a:lumMod val="75000"/>
-              <a:lumOff val="25000"/>
-            </a:schemeClr>
-          </a:solidFill>
-          <a:ln>
-            <a:noFill/>
-          </a:ln>
-        </p:spPr>
-        <p:style>
-          <a:lnRef idx="2">
-            <a:schemeClr val="accent1">
-              <a:shade val="15000"/>
-            </a:schemeClr>
-          </a:lnRef>
-          <a:fillRef idx="1">
-            <a:schemeClr val="accent1"/>
-          </a:fillRef>
-          <a:effectRef idx="0">
-            <a:schemeClr val="accent1"/>
-          </a:effectRef>
-          <a:fontRef idx="minor">
-            <a:schemeClr val="lt1"/>
-          </a:fontRef>
-        </p:style>
-        <p:txBody>
-          <a:bodyPr rtlCol="0" anchor="ctr"/>
-          <a:lstStyle/>
-          <a:p>
-            <a:pPr algn="ctr"/>
-            <a:endParaRPr lang="de-DE">
-              <a:solidFill>
-                <a:srgbClr val="FF0000"/>
-              </a:solidFill>
-            </a:endParaRPr>
-          </a:p>
-        </p:txBody>
-      </p:sp>
-      <p:sp>
-        <p:nvSpPr>
           <p:cNvPr id="49" name="Gleichschenkliges Dreieck 48">
             <a:extLst>
               <a:ext uri="{FF2B5EF4-FFF2-40B4-BE49-F238E27FC236}">
@@ -5434,118 +5462,128 @@
           </a:p>
         </p:txBody>
       </p:sp>
+      <p:sp>
+        <p:nvSpPr>
+          <p:cNvPr id="37" name="Gleichschenkliges Dreieck 36">
+            <a:extLst>
+              <a:ext uri="{FF2B5EF4-FFF2-40B4-BE49-F238E27FC236}">
+                <a16:creationId xmlns:a16="http://schemas.microsoft.com/office/drawing/2014/main" id="{2DD60FC1-CC86-E205-44D9-E6EEE0B6B1F3}"/>
+              </a:ext>
+            </a:extLst>
+          </p:cNvPr>
+          <p:cNvSpPr/>
+          <p:nvPr/>
+        </p:nvSpPr>
+        <p:spPr>
+          <a:xfrm>
+            <a:off x="10411932" y="69022"/>
+            <a:ext cx="371475" cy="312498"/>
+          </a:xfrm>
+          <a:prstGeom prst="triangle">
+            <a:avLst/>
+          </a:prstGeom>
+          <a:noFill/>
+          <a:ln>
+            <a:noFill/>
+          </a:ln>
+        </p:spPr>
+        <p:style>
+          <a:lnRef idx="2">
+            <a:schemeClr val="accent1">
+              <a:shade val="15000"/>
+            </a:schemeClr>
+          </a:lnRef>
+          <a:fillRef idx="1">
+            <a:schemeClr val="accent1"/>
+          </a:fillRef>
+          <a:effectRef idx="0">
+            <a:schemeClr val="accent1"/>
+          </a:effectRef>
+          <a:fontRef idx="minor">
+            <a:schemeClr val="lt1"/>
+          </a:fontRef>
+        </p:style>
+        <p:txBody>
+          <a:bodyPr rtlCol="0" anchor="ctr"/>
+          <a:lstStyle/>
+          <a:p>
+            <a:pPr algn="ctr"/>
+            <a:endParaRPr lang="de-DE"/>
+          </a:p>
+        </p:txBody>
+      </p:sp>
+      <p:sp>
+        <p:nvSpPr>
+          <p:cNvPr id="45" name="Raute 44">
+            <a:extLst>
+              <a:ext uri="{FF2B5EF4-FFF2-40B4-BE49-F238E27FC236}">
+                <a16:creationId xmlns:a16="http://schemas.microsoft.com/office/drawing/2014/main" id="{486D54D7-1EB5-8537-039D-58312142C10C}"/>
+              </a:ext>
+            </a:extLst>
+          </p:cNvPr>
+          <p:cNvSpPr/>
+          <p:nvPr/>
+        </p:nvSpPr>
+        <p:spPr>
+          <a:xfrm rot="21114116">
+            <a:off x="5973884" y="756887"/>
+            <a:ext cx="274995" cy="111210"/>
+          </a:xfrm>
+          <a:prstGeom prst="diamond">
+            <a:avLst/>
+          </a:prstGeom>
+          <a:noFill/>
+          <a:ln>
+            <a:solidFill>
+              <a:schemeClr val="tx1"/>
+            </a:solidFill>
+          </a:ln>
+        </p:spPr>
+        <p:style>
+          <a:lnRef idx="2">
+            <a:schemeClr val="accent1">
+              <a:shade val="15000"/>
+            </a:schemeClr>
+          </a:lnRef>
+          <a:fillRef idx="1">
+            <a:schemeClr val="accent1"/>
+          </a:fillRef>
+          <a:effectRef idx="0">
+            <a:schemeClr val="accent1"/>
+          </a:effectRef>
+          <a:fontRef idx="minor">
+            <a:schemeClr val="lt1"/>
+          </a:fontRef>
+        </p:style>
+        <p:txBody>
+          <a:bodyPr rtlCol="0" anchor="ctr"/>
+          <a:lstStyle/>
+          <a:p>
+            <a:pPr algn="ctr"/>
+            <a:endParaRPr lang="de-DE"/>
+          </a:p>
+        </p:txBody>
+      </p:sp>
       <p:cxnSp>
         <p:nvCxnSpPr>
-          <p:cNvPr id="55" name="Gerade Verbindung mit Pfeil 54">
-            <a:extLst>
-              <a:ext uri="{FF2B5EF4-FFF2-40B4-BE49-F238E27FC236}">
-                <a16:creationId xmlns:a16="http://schemas.microsoft.com/office/drawing/2014/main" id="{BFBF4CCD-BEDD-6285-AC5D-D1582235E09F}"/>
+          <p:cNvPr id="46" name="Gerade Verbindung mit Pfeil 45">
+            <a:extLst>
+              <a:ext uri="{FF2B5EF4-FFF2-40B4-BE49-F238E27FC236}">
+                <a16:creationId xmlns:a16="http://schemas.microsoft.com/office/drawing/2014/main" id="{01D303AD-CF92-9C9E-67E6-364B107DB3EC}"/>
               </a:ext>
             </a:extLst>
           </p:cNvPr>
           <p:cNvCxnSpPr>
             <a:cxnSpLocks/>
+            <a:stCxn id="5" idx="3"/>
+            <a:endCxn id="45" idx="1"/>
           </p:cNvCxnSpPr>
           <p:nvPr/>
         </p:nvCxnSpPr>
         <p:spPr>
           <a:xfrm flipV="1">
-            <a:off x="2895959" y="1042750"/>
-            <a:ext cx="854847" cy="4886"/>
-          </a:xfrm>
-          <a:prstGeom prst="straightConnector1">
-            <a:avLst/>
-          </a:prstGeom>
-          <a:ln w="19050" cap="flat" cmpd="sng" algn="ctr">
-            <a:solidFill>
-              <a:schemeClr val="dk1"/>
-            </a:solidFill>
-            <a:prstDash val="dash"/>
-            <a:round/>
-            <a:headEnd type="none" w="med" len="med"/>
-            <a:tailEnd type="none" w="med" len="lg"/>
-          </a:ln>
-        </p:spPr>
-        <p:style>
-          <a:lnRef idx="0">
-            <a:scrgbClr r="0" g="0" b="0"/>
-          </a:lnRef>
-          <a:fillRef idx="0">
-            <a:scrgbClr r="0" g="0" b="0"/>
-          </a:fillRef>
-          <a:effectRef idx="0">
-            <a:scrgbClr r="0" g="0" b="0"/>
-          </a:effectRef>
-          <a:fontRef idx="minor">
-            <a:schemeClr val="tx1"/>
-          </a:fontRef>
-        </p:style>
-      </p:cxnSp>
-      <p:cxnSp>
-        <p:nvCxnSpPr>
-          <p:cNvPr id="62" name="Gerade Verbindung mit Pfeil 61">
-            <a:extLst>
-              <a:ext uri="{FF2B5EF4-FFF2-40B4-BE49-F238E27FC236}">
-                <a16:creationId xmlns:a16="http://schemas.microsoft.com/office/drawing/2014/main" id="{753E9498-F000-8BC7-81FF-6E15368A1DE7}"/>
-              </a:ext>
-            </a:extLst>
-          </p:cNvPr>
-          <p:cNvCxnSpPr>
-            <a:cxnSpLocks/>
-          </p:cNvCxnSpPr>
-          <p:nvPr/>
-        </p:nvCxnSpPr>
-        <p:spPr>
-          <a:xfrm>
-            <a:off x="2895959" y="1293136"/>
-            <a:ext cx="956146" cy="0"/>
-          </a:xfrm>
-          <a:prstGeom prst="straightConnector1">
-            <a:avLst/>
-          </a:prstGeom>
-          <a:ln w="19050" cap="flat" cmpd="sng" algn="ctr">
-            <a:solidFill>
-              <a:schemeClr val="dk1"/>
-            </a:solidFill>
-            <a:prstDash val="dash"/>
-            <a:round/>
-            <a:headEnd type="none" w="med" len="med"/>
-            <a:tailEnd type="arrow" w="med" len="lg"/>
-          </a:ln>
-        </p:spPr>
-        <p:style>
-          <a:lnRef idx="0">
-            <a:scrgbClr r="0" g="0" b="0"/>
-          </a:lnRef>
-          <a:fillRef idx="0">
-            <a:scrgbClr r="0" g="0" b="0"/>
-          </a:fillRef>
-          <a:effectRef idx="0">
-            <a:scrgbClr r="0" g="0" b="0"/>
-          </a:effectRef>
-          <a:fontRef idx="minor">
-            <a:schemeClr val="tx1"/>
-          </a:fontRef>
-        </p:style>
-      </p:cxnSp>
-      <p:cxnSp>
-        <p:nvCxnSpPr>
-          <p:cNvPr id="32" name="Gerade Verbindung mit Pfeil 31">
-            <a:extLst>
-              <a:ext uri="{FF2B5EF4-FFF2-40B4-BE49-F238E27FC236}">
-                <a16:creationId xmlns:a16="http://schemas.microsoft.com/office/drawing/2014/main" id="{E2EC257F-D783-562D-EAF9-172B3982A0DD}"/>
-              </a:ext>
-            </a:extLst>
-          </p:cNvPr>
-          <p:cNvCxnSpPr>
-            <a:cxnSpLocks/>
-          </p:cNvCxnSpPr>
-          <p:nvPr/>
-        </p:nvCxnSpPr>
-        <p:spPr>
-          <a:xfrm>
-            <a:off x="2895959" y="574028"/>
-            <a:ext cx="854847" cy="0"/>
+            <a:off x="2161509" y="831861"/>
+            <a:ext cx="3813746" cy="420194"/>
           </a:xfrm>
           <a:prstGeom prst="straightConnector1">
             <a:avLst/>
@@ -5577,10 +5615,10 @@
       </p:cxnSp>
       <p:sp>
         <p:nvSpPr>
-          <p:cNvPr id="37" name="Gleichschenkliges Dreieck 36">
-            <a:extLst>
-              <a:ext uri="{FF2B5EF4-FFF2-40B4-BE49-F238E27FC236}">
-                <a16:creationId xmlns:a16="http://schemas.microsoft.com/office/drawing/2014/main" id="{2DD60FC1-CC86-E205-44D9-E6EEE0B6B1F3}"/>
+          <p:cNvPr id="54" name="Raute 53">
+            <a:extLst>
+              <a:ext uri="{FF2B5EF4-FFF2-40B4-BE49-F238E27FC236}">
+                <a16:creationId xmlns:a16="http://schemas.microsoft.com/office/drawing/2014/main" id="{36B491E9-114F-282A-2515-0E2273AE345B}"/>
               </a:ext>
             </a:extLst>
           </p:cNvPr>
@@ -5588,16 +5626,18 @@
           <p:nvPr/>
         </p:nvSpPr>
         <p:spPr>
-          <a:xfrm>
-            <a:off x="10411932" y="69022"/>
-            <a:ext cx="371475" cy="312498"/>
-          </a:xfrm>
-          <a:prstGeom prst="triangle">
+          <a:xfrm rot="19770736">
+            <a:off x="6012109" y="900578"/>
+            <a:ext cx="274995" cy="111210"/>
+          </a:xfrm>
+          <a:prstGeom prst="diamond">
             <a:avLst/>
           </a:prstGeom>
           <a:noFill/>
           <a:ln>
-            <a:noFill/>
+            <a:solidFill>
+              <a:schemeClr val="tx1"/>
+            </a:solidFill>
           </a:ln>
         </p:spPr>
         <p:style>
@@ -5625,24 +5665,73 @@
           </a:p>
         </p:txBody>
       </p:sp>
-      <p:sp>
-        <p:nvSpPr>
-          <p:cNvPr id="63" name="Textfeld 62">
-            <a:extLst>
-              <a:ext uri="{FF2B5EF4-FFF2-40B4-BE49-F238E27FC236}">
-                <a16:creationId xmlns:a16="http://schemas.microsoft.com/office/drawing/2014/main" id="{CABD2C3C-16FC-FF1F-F36D-45F28F95D89F}"/>
-              </a:ext>
-            </a:extLst>
-          </p:cNvPr>
-          <p:cNvSpPr txBox="1"/>
+      <p:cxnSp>
+        <p:nvCxnSpPr>
+          <p:cNvPr id="56" name="Gerade Verbindung mit Pfeil 55">
+            <a:extLst>
+              <a:ext uri="{FF2B5EF4-FFF2-40B4-BE49-F238E27FC236}">
+                <a16:creationId xmlns:a16="http://schemas.microsoft.com/office/drawing/2014/main" id="{CB3BB993-7ED9-5989-1990-19D5D1F31BE2}"/>
+              </a:ext>
+            </a:extLst>
+          </p:cNvPr>
+          <p:cNvCxnSpPr>
+            <a:cxnSpLocks/>
+            <a:stCxn id="3" idx="3"/>
+            <a:endCxn id="54" idx="1"/>
+          </p:cNvCxnSpPr>
           <p:nvPr/>
-        </p:nvSpPr>
+        </p:nvCxnSpPr>
         <p:spPr>
-          <a:xfrm>
-            <a:off x="984415" y="981281"/>
-            <a:ext cx="1737003" cy="369332"/>
-          </a:xfrm>
-          <a:prstGeom prst="rect">
+          <a:xfrm flipV="1">
+            <a:off x="2029017" y="1025943"/>
+            <a:ext cx="4002103" cy="2139994"/>
+          </a:xfrm>
+          <a:prstGeom prst="straightConnector1">
+            <a:avLst/>
+          </a:prstGeom>
+          <a:ln w="19050" cap="flat" cmpd="sng" algn="ctr">
+            <a:solidFill>
+              <a:schemeClr val="dk1"/>
+            </a:solidFill>
+            <a:prstDash val="solid"/>
+            <a:round/>
+            <a:headEnd type="none" w="med" len="med"/>
+            <a:tailEnd type="none" w="med" len="lg"/>
+          </a:ln>
+        </p:spPr>
+        <p:style>
+          <a:lnRef idx="0">
+            <a:scrgbClr r="0" g="0" b="0"/>
+          </a:lnRef>
+          <a:fillRef idx="0">
+            <a:scrgbClr r="0" g="0" b="0"/>
+          </a:fillRef>
+          <a:effectRef idx="0">
+            <a:scrgbClr r="0" g="0" b="0"/>
+          </a:effectRef>
+          <a:fontRef idx="minor">
+            <a:schemeClr val="tx1"/>
+          </a:fontRef>
+        </p:style>
+      </p:cxnSp>
+      <p:sp>
+        <p:nvSpPr>
+          <p:cNvPr id="57" name="Raute 56">
+            <a:extLst>
+              <a:ext uri="{FF2B5EF4-FFF2-40B4-BE49-F238E27FC236}">
+                <a16:creationId xmlns:a16="http://schemas.microsoft.com/office/drawing/2014/main" id="{D4DE955F-7598-4825-F9F5-E7E0DF73AAD8}"/>
+              </a:ext>
+            </a:extLst>
+          </p:cNvPr>
+          <p:cNvSpPr/>
+          <p:nvPr/>
+        </p:nvSpPr>
+        <p:spPr>
+          <a:xfrm rot="19065828">
+            <a:off x="6015707" y="1065405"/>
+            <a:ext cx="274995" cy="111210"/>
+          </a:xfrm>
+          <a:prstGeom prst="diamond">
             <a:avLst/>
           </a:prstGeom>
           <a:noFill/>
@@ -5652,16 +5741,423 @@
             </a:solidFill>
           </a:ln>
         </p:spPr>
-        <p:txBody>
-          <a:bodyPr wrap="square" rtlCol="0">
-            <a:spAutoFit/>
-          </a:bodyPr>
+        <p:style>
+          <a:lnRef idx="2">
+            <a:schemeClr val="accent1">
+              <a:shade val="15000"/>
+            </a:schemeClr>
+          </a:lnRef>
+          <a:fillRef idx="1">
+            <a:schemeClr val="accent1"/>
+          </a:fillRef>
+          <a:effectRef idx="0">
+            <a:schemeClr val="accent1"/>
+          </a:effectRef>
+          <a:fontRef idx="minor">
+            <a:schemeClr val="lt1"/>
+          </a:fontRef>
+        </p:style>
+        <p:txBody>
+          <a:bodyPr rtlCol="0" anchor="ctr"/>
           <a:lstStyle/>
           <a:p>
-            <a:r>
-              <a:rPr lang="de-DE" dirty="0"/>
-              <a:t>Legende:</a:t>
-            </a:r>
+            <a:pPr algn="ctr"/>
+            <a:endParaRPr lang="de-DE"/>
+          </a:p>
+        </p:txBody>
+      </p:sp>
+      <p:cxnSp>
+        <p:nvCxnSpPr>
+          <p:cNvPr id="58" name="Gerade Verbindung mit Pfeil 57">
+            <a:extLst>
+              <a:ext uri="{FF2B5EF4-FFF2-40B4-BE49-F238E27FC236}">
+                <a16:creationId xmlns:a16="http://schemas.microsoft.com/office/drawing/2014/main" id="{002C31AA-0CFF-D6F7-B0E3-0CEFA2D3F0DF}"/>
+              </a:ext>
+            </a:extLst>
+          </p:cNvPr>
+          <p:cNvCxnSpPr>
+            <a:cxnSpLocks/>
+            <a:stCxn id="4" idx="3"/>
+            <a:endCxn id="57" idx="1"/>
+          </p:cNvCxnSpPr>
+          <p:nvPr/>
+        </p:nvCxnSpPr>
+        <p:spPr>
+          <a:xfrm flipV="1">
+            <a:off x="2614752" y="1213434"/>
+            <a:ext cx="3436652" cy="3248280"/>
+          </a:xfrm>
+          <a:prstGeom prst="straightConnector1">
+            <a:avLst/>
+          </a:prstGeom>
+          <a:ln w="19050" cap="flat" cmpd="sng" algn="ctr">
+            <a:solidFill>
+              <a:schemeClr val="dk1"/>
+            </a:solidFill>
+            <a:prstDash val="solid"/>
+            <a:round/>
+            <a:headEnd type="none" w="med" len="med"/>
+            <a:tailEnd type="none" w="med" len="lg"/>
+          </a:ln>
+        </p:spPr>
+        <p:style>
+          <a:lnRef idx="0">
+            <a:scrgbClr r="0" g="0" b="0"/>
+          </a:lnRef>
+          <a:fillRef idx="0">
+            <a:scrgbClr r="0" g="0" b="0"/>
+          </a:fillRef>
+          <a:effectRef idx="0">
+            <a:scrgbClr r="0" g="0" b="0"/>
+          </a:effectRef>
+          <a:fontRef idx="minor">
+            <a:schemeClr val="tx1"/>
+          </a:fontRef>
+        </p:style>
+      </p:cxnSp>
+      <p:cxnSp>
+        <p:nvCxnSpPr>
+          <p:cNvPr id="71" name="Gerade Verbindung mit Pfeil 70">
+            <a:extLst>
+              <a:ext uri="{FF2B5EF4-FFF2-40B4-BE49-F238E27FC236}">
+                <a16:creationId xmlns:a16="http://schemas.microsoft.com/office/drawing/2014/main" id="{41FAD59C-9CA3-5AFE-163E-16CA152AED88}"/>
+              </a:ext>
+            </a:extLst>
+          </p:cNvPr>
+          <p:cNvCxnSpPr>
+            <a:cxnSpLocks/>
+            <a:stCxn id="12" idx="3"/>
+            <a:endCxn id="2" idx="1"/>
+          </p:cNvCxnSpPr>
+          <p:nvPr/>
+        </p:nvCxnSpPr>
+        <p:spPr>
+          <a:xfrm>
+            <a:off x="2161509" y="1686912"/>
+            <a:ext cx="1775035" cy="2651730"/>
+          </a:xfrm>
+          <a:prstGeom prst="straightConnector1">
+            <a:avLst/>
+          </a:prstGeom>
+          <a:ln w="19050" cap="flat" cmpd="sng" algn="ctr">
+            <a:solidFill>
+              <a:schemeClr val="dk1"/>
+            </a:solidFill>
+            <a:prstDash val="solid"/>
+            <a:round/>
+            <a:headEnd type="none" w="med" len="med"/>
+            <a:tailEnd type="none" w="med" len="lg"/>
+          </a:ln>
+        </p:spPr>
+        <p:style>
+          <a:lnRef idx="0">
+            <a:scrgbClr r="0" g="0" b="0"/>
+          </a:lnRef>
+          <a:fillRef idx="0">
+            <a:scrgbClr r="0" g="0" b="0"/>
+          </a:fillRef>
+          <a:effectRef idx="0">
+            <a:scrgbClr r="0" g="0" b="0"/>
+          </a:effectRef>
+          <a:fontRef idx="minor">
+            <a:schemeClr val="tx1"/>
+          </a:fontRef>
+        </p:style>
+      </p:cxnSp>
+      <p:cxnSp>
+        <p:nvCxnSpPr>
+          <p:cNvPr id="74" name="Gerade Verbindung mit Pfeil 73">
+            <a:extLst>
+              <a:ext uri="{FF2B5EF4-FFF2-40B4-BE49-F238E27FC236}">
+                <a16:creationId xmlns:a16="http://schemas.microsoft.com/office/drawing/2014/main" id="{36A67BDC-126C-2122-CB1A-9BD5FA7D0023}"/>
+              </a:ext>
+            </a:extLst>
+          </p:cNvPr>
+          <p:cNvCxnSpPr>
+            <a:cxnSpLocks/>
+            <a:stCxn id="2" idx="1"/>
+            <a:endCxn id="18" idx="3"/>
+          </p:cNvCxnSpPr>
+          <p:nvPr/>
+        </p:nvCxnSpPr>
+        <p:spPr>
+          <a:xfrm flipH="1" flipV="1">
+            <a:off x="2029017" y="3398018"/>
+            <a:ext cx="1907527" cy="940624"/>
+          </a:xfrm>
+          <a:prstGeom prst="straightConnector1">
+            <a:avLst/>
+          </a:prstGeom>
+          <a:ln w="19050" cap="flat" cmpd="sng" algn="ctr">
+            <a:solidFill>
+              <a:schemeClr val="dk1"/>
+            </a:solidFill>
+            <a:prstDash val="solid"/>
+            <a:round/>
+            <a:headEnd type="none" w="med" len="med"/>
+            <a:tailEnd type="none" w="med" len="lg"/>
+          </a:ln>
+        </p:spPr>
+        <p:style>
+          <a:lnRef idx="0">
+            <a:scrgbClr r="0" g="0" b="0"/>
+          </a:lnRef>
+          <a:fillRef idx="0">
+            <a:scrgbClr r="0" g="0" b="0"/>
+          </a:fillRef>
+          <a:effectRef idx="0">
+            <a:scrgbClr r="0" g="0" b="0"/>
+          </a:effectRef>
+          <a:fontRef idx="minor">
+            <a:schemeClr val="tx1"/>
+          </a:fontRef>
+        </p:style>
+      </p:cxnSp>
+      <p:cxnSp>
+        <p:nvCxnSpPr>
+          <p:cNvPr id="77" name="Gerade Verbindung mit Pfeil 76">
+            <a:extLst>
+              <a:ext uri="{FF2B5EF4-FFF2-40B4-BE49-F238E27FC236}">
+                <a16:creationId xmlns:a16="http://schemas.microsoft.com/office/drawing/2014/main" id="{B0D52FFB-6EF7-4126-2D74-B42E7F85B5B2}"/>
+              </a:ext>
+            </a:extLst>
+          </p:cNvPr>
+          <p:cNvCxnSpPr>
+            <a:cxnSpLocks/>
+            <a:stCxn id="2" idx="1"/>
+            <a:endCxn id="8" idx="3"/>
+          </p:cNvCxnSpPr>
+          <p:nvPr/>
+        </p:nvCxnSpPr>
+        <p:spPr>
+          <a:xfrm flipH="1">
+            <a:off x="2614752" y="4338642"/>
+            <a:ext cx="1321792" cy="349683"/>
+          </a:xfrm>
+          <a:prstGeom prst="straightConnector1">
+            <a:avLst/>
+          </a:prstGeom>
+          <a:ln w="19050" cap="flat" cmpd="sng" algn="ctr">
+            <a:solidFill>
+              <a:schemeClr val="dk1"/>
+            </a:solidFill>
+            <a:prstDash val="solid"/>
+            <a:round/>
+            <a:headEnd type="none" w="med" len="med"/>
+            <a:tailEnd type="none" w="med" len="lg"/>
+          </a:ln>
+        </p:spPr>
+        <p:style>
+          <a:lnRef idx="0">
+            <a:scrgbClr r="0" g="0" b="0"/>
+          </a:lnRef>
+          <a:fillRef idx="0">
+            <a:scrgbClr r="0" g="0" b="0"/>
+          </a:fillRef>
+          <a:effectRef idx="0">
+            <a:scrgbClr r="0" g="0" b="0"/>
+          </a:effectRef>
+          <a:fontRef idx="minor">
+            <a:schemeClr val="tx1"/>
+          </a:fontRef>
+        </p:style>
+      </p:cxnSp>
+      <p:cxnSp>
+        <p:nvCxnSpPr>
+          <p:cNvPr id="80" name="Gerade Verbindung mit Pfeil 79">
+            <a:extLst>
+              <a:ext uri="{FF2B5EF4-FFF2-40B4-BE49-F238E27FC236}">
+                <a16:creationId xmlns:a16="http://schemas.microsoft.com/office/drawing/2014/main" id="{0602FAB8-0045-E296-A6FA-14142A0293DA}"/>
+              </a:ext>
+            </a:extLst>
+          </p:cNvPr>
+          <p:cNvCxnSpPr>
+            <a:cxnSpLocks/>
+            <a:stCxn id="15" idx="1"/>
+            <a:endCxn id="2" idx="0"/>
+          </p:cNvCxnSpPr>
+          <p:nvPr/>
+        </p:nvCxnSpPr>
+        <p:spPr>
+          <a:xfrm flipH="1">
+            <a:off x="5207918" y="1080502"/>
+            <a:ext cx="1074732" cy="3073790"/>
+          </a:xfrm>
+          <a:prstGeom prst="straightConnector1">
+            <a:avLst/>
+          </a:prstGeom>
+          <a:ln w="19050" cap="flat" cmpd="sng" algn="ctr">
+            <a:solidFill>
+              <a:schemeClr val="dk1"/>
+            </a:solidFill>
+            <a:prstDash val="solid"/>
+            <a:round/>
+            <a:headEnd type="none" w="med" len="med"/>
+            <a:tailEnd type="none" w="med" len="lg"/>
+          </a:ln>
+        </p:spPr>
+        <p:style>
+          <a:lnRef idx="0">
+            <a:scrgbClr r="0" g="0" b="0"/>
+          </a:lnRef>
+          <a:fillRef idx="0">
+            <a:scrgbClr r="0" g="0" b="0"/>
+          </a:fillRef>
+          <a:effectRef idx="0">
+            <a:scrgbClr r="0" g="0" b="0"/>
+          </a:effectRef>
+          <a:fontRef idx="minor">
+            <a:schemeClr val="tx1"/>
+          </a:fontRef>
+        </p:style>
+      </p:cxnSp>
+      <p:cxnSp>
+        <p:nvCxnSpPr>
+          <p:cNvPr id="83" name="Gerade Verbindung mit Pfeil 82">
+            <a:extLst>
+              <a:ext uri="{FF2B5EF4-FFF2-40B4-BE49-F238E27FC236}">
+                <a16:creationId xmlns:a16="http://schemas.microsoft.com/office/drawing/2014/main" id="{0B158D4F-CD27-A137-8247-4CB0C51F6A53}"/>
+              </a:ext>
+            </a:extLst>
+          </p:cNvPr>
+          <p:cNvCxnSpPr>
+            <a:cxnSpLocks/>
+            <a:stCxn id="6" idx="1"/>
+            <a:endCxn id="2" idx="3"/>
+          </p:cNvCxnSpPr>
+          <p:nvPr/>
+        </p:nvCxnSpPr>
+        <p:spPr>
+          <a:xfrm flipH="1">
+            <a:off x="6479291" y="4153372"/>
+            <a:ext cx="1271374" cy="185270"/>
+          </a:xfrm>
+          <a:prstGeom prst="straightConnector1">
+            <a:avLst/>
+          </a:prstGeom>
+          <a:ln w="19050" cap="flat" cmpd="sng" algn="ctr">
+            <a:solidFill>
+              <a:schemeClr val="dk1"/>
+            </a:solidFill>
+            <a:prstDash val="solid"/>
+            <a:round/>
+            <a:headEnd type="none" w="med" len="med"/>
+            <a:tailEnd type="none" w="med" len="lg"/>
+          </a:ln>
+        </p:spPr>
+        <p:style>
+          <a:lnRef idx="0">
+            <a:scrgbClr r="0" g="0" b="0"/>
+          </a:lnRef>
+          <a:fillRef idx="0">
+            <a:scrgbClr r="0" g="0" b="0"/>
+          </a:fillRef>
+          <a:effectRef idx="0">
+            <a:scrgbClr r="0" g="0" b="0"/>
+          </a:effectRef>
+          <a:fontRef idx="minor">
+            <a:schemeClr val="tx1"/>
+          </a:fontRef>
+        </p:style>
+      </p:cxnSp>
+      <p:cxnSp>
+        <p:nvCxnSpPr>
+          <p:cNvPr id="86" name="Gerade Verbindung mit Pfeil 85">
+            <a:extLst>
+              <a:ext uri="{FF2B5EF4-FFF2-40B4-BE49-F238E27FC236}">
+                <a16:creationId xmlns:a16="http://schemas.microsoft.com/office/drawing/2014/main" id="{AC7E8A4B-5455-2BD5-AE57-BA778A674663}"/>
+              </a:ext>
+            </a:extLst>
+          </p:cNvPr>
+          <p:cNvCxnSpPr>
+            <a:cxnSpLocks/>
+            <a:stCxn id="6" idx="0"/>
+            <a:endCxn id="90" idx="3"/>
+          </p:cNvCxnSpPr>
+          <p:nvPr/>
+        </p:nvCxnSpPr>
+        <p:spPr>
+          <a:xfrm flipH="1" flipV="1">
+            <a:off x="9026694" y="1151647"/>
+            <a:ext cx="768739" cy="2845476"/>
+          </a:xfrm>
+          <a:prstGeom prst="straightConnector1">
+            <a:avLst/>
+          </a:prstGeom>
+          <a:ln w="19050" cap="flat" cmpd="sng" algn="ctr">
+            <a:solidFill>
+              <a:schemeClr val="dk1"/>
+            </a:solidFill>
+            <a:prstDash val="solid"/>
+            <a:round/>
+            <a:headEnd type="none" w="med" len="med"/>
+            <a:tailEnd type="none" w="med" len="lg"/>
+          </a:ln>
+        </p:spPr>
+        <p:style>
+          <a:lnRef idx="0">
+            <a:scrgbClr r="0" g="0" b="0"/>
+          </a:lnRef>
+          <a:fillRef idx="0">
+            <a:scrgbClr r="0" g="0" b="0"/>
+          </a:fillRef>
+          <a:effectRef idx="0">
+            <a:scrgbClr r="0" g="0" b="0"/>
+          </a:effectRef>
+          <a:fontRef idx="minor">
+            <a:schemeClr val="tx1"/>
+          </a:fontRef>
+        </p:style>
+      </p:cxnSp>
+      <p:sp>
+        <p:nvSpPr>
+          <p:cNvPr id="90" name="Raute 89">
+            <a:extLst>
+              <a:ext uri="{FF2B5EF4-FFF2-40B4-BE49-F238E27FC236}">
+                <a16:creationId xmlns:a16="http://schemas.microsoft.com/office/drawing/2014/main" id="{B056E290-D111-8C2A-DA0A-15B3F0E39CC1}"/>
+              </a:ext>
+            </a:extLst>
+          </p:cNvPr>
+          <p:cNvSpPr/>
+          <p:nvPr/>
+        </p:nvSpPr>
+        <p:spPr>
+          <a:xfrm rot="3965816">
+            <a:off x="8833484" y="970337"/>
+            <a:ext cx="274995" cy="111210"/>
+          </a:xfrm>
+          <a:prstGeom prst="diamond">
+            <a:avLst/>
+          </a:prstGeom>
+          <a:noFill/>
+          <a:ln>
+            <a:solidFill>
+              <a:schemeClr val="tx1"/>
+            </a:solidFill>
+          </a:ln>
+        </p:spPr>
+        <p:style>
+          <a:lnRef idx="2">
+            <a:schemeClr val="accent1">
+              <a:shade val="15000"/>
+            </a:schemeClr>
+          </a:lnRef>
+          <a:fillRef idx="1">
+            <a:schemeClr val="accent1"/>
+          </a:fillRef>
+          <a:effectRef idx="0">
+            <a:schemeClr val="accent1"/>
+          </a:effectRef>
+          <a:fontRef idx="minor">
+            <a:schemeClr val="lt1"/>
+          </a:fontRef>
+        </p:style>
+        <p:txBody>
+          <a:bodyPr rtlCol="0" anchor="ctr"/>
+          <a:lstStyle/>
+          <a:p>
+            <a:pPr algn="ctr"/>
+            <a:endParaRPr lang="de-DE"/>
           </a:p>
         </p:txBody>
       </p:sp>
@@ -7481,7 +7977,7 @@
         </p:nvSpPr>
         <p:spPr>
           <a:xfrm>
-            <a:off x="2056827" y="3379602"/>
+            <a:off x="1294827" y="3379602"/>
             <a:ext cx="3031056" cy="413201"/>
           </a:xfrm>
           <a:prstGeom prst="roundRect">
@@ -7657,7 +8153,7 @@
                 <a:latin typeface="Arial" panose="020B0604020202020204" pitchFamily="34" charset="0"/>
                 <a:cs typeface="Arial" panose="020B0604020202020204" pitchFamily="34" charset="0"/>
               </a:rPr>
-              <a:t>Menüeintrag wechseln</a:t>
+              <a:t>Menütitel wechseln</a:t>
             </a:r>
           </a:p>
         </p:txBody>
@@ -8149,7 +8645,7 @@
         </p:nvSpPr>
         <p:spPr>
           <a:xfrm>
-            <a:off x="2060373" y="4903892"/>
+            <a:off x="1298373" y="4903892"/>
             <a:ext cx="3031056" cy="619407"/>
           </a:xfrm>
           <a:prstGeom prst="roundRect">
@@ -8858,8 +9354,8 @@
         </p:nvCxnSpPr>
         <p:spPr>
           <a:xfrm>
-            <a:off x="5087883" y="3586203"/>
-            <a:ext cx="2276064" cy="1477"/>
+            <a:off x="4325883" y="3586203"/>
+            <a:ext cx="3038064" cy="1477"/>
           </a:xfrm>
           <a:prstGeom prst="line">
             <a:avLst/>
@@ -9677,8 +10173,8 @@
         </p:nvCxnSpPr>
         <p:spPr>
           <a:xfrm>
-            <a:off x="5091429" y="5213596"/>
-            <a:ext cx="1461950" cy="1575"/>
+            <a:off x="4329429" y="5213596"/>
+            <a:ext cx="2223950" cy="1575"/>
           </a:xfrm>
           <a:prstGeom prst="line">
             <a:avLst/>
@@ -9724,7 +10220,7 @@
         </p:nvCxnSpPr>
         <p:spPr>
           <a:xfrm>
-            <a:off x="3572355" y="3792803"/>
+            <a:off x="2810355" y="3792803"/>
             <a:ext cx="3546" cy="1111089"/>
           </a:xfrm>
           <a:prstGeom prst="line">
@@ -9755,10 +10251,10 @@
       </p:cxnSp>
       <p:sp>
         <p:nvSpPr>
-          <p:cNvPr id="106" name="Gleichschenkliges Dreieck 105">
-            <a:extLst>
-              <a:ext uri="{FF2B5EF4-FFF2-40B4-BE49-F238E27FC236}">
-                <a16:creationId xmlns:a16="http://schemas.microsoft.com/office/drawing/2014/main" id="{BB51508D-910B-44E7-C8A9-D8CDC216B3CA}"/>
+          <p:cNvPr id="121" name="Gleichschenkliges Dreieck 120">
+            <a:extLst>
+              <a:ext uri="{FF2B5EF4-FFF2-40B4-BE49-F238E27FC236}">
+                <a16:creationId xmlns:a16="http://schemas.microsoft.com/office/drawing/2014/main" id="{4C7F3838-7432-E7A8-49F8-22C01FECF028}"/>
               </a:ext>
             </a:extLst>
           </p:cNvPr>
@@ -9767,7 +10263,7 @@
         </p:nvSpPr>
         <p:spPr>
           <a:xfrm>
-            <a:off x="944913" y="3164078"/>
+            <a:off x="943537" y="1142223"/>
             <a:ext cx="386648" cy="413201"/>
           </a:xfrm>
           <a:prstGeom prst="triangle">
@@ -9806,66 +10302,21 @@
           </a:p>
         </p:txBody>
       </p:sp>
-      <p:cxnSp>
-        <p:nvCxnSpPr>
-          <p:cNvPr id="115" name="Gerader Verbinder 114">
-            <a:extLst>
-              <a:ext uri="{FF2B5EF4-FFF2-40B4-BE49-F238E27FC236}">
-                <a16:creationId xmlns:a16="http://schemas.microsoft.com/office/drawing/2014/main" id="{E8EE4747-3DA0-4192-EFD9-B48EBDCBF49C}"/>
-              </a:ext>
-            </a:extLst>
-          </p:cNvPr>
-          <p:cNvCxnSpPr>
-            <a:cxnSpLocks/>
-            <a:stCxn id="106" idx="2"/>
-            <a:endCxn id="23" idx="1"/>
-          </p:cNvCxnSpPr>
+      <p:sp>
+        <p:nvSpPr>
+          <p:cNvPr id="125" name="Gleichschenkliges Dreieck 124">
+            <a:extLst>
+              <a:ext uri="{FF2B5EF4-FFF2-40B4-BE49-F238E27FC236}">
+                <a16:creationId xmlns:a16="http://schemas.microsoft.com/office/drawing/2014/main" id="{37A775E3-EDF7-9780-06F7-32B092C8E78A}"/>
+              </a:ext>
+            </a:extLst>
+          </p:cNvPr>
+          <p:cNvSpPr/>
           <p:nvPr/>
-        </p:nvCxnSpPr>
+        </p:nvSpPr>
         <p:spPr>
           <a:xfrm>
-            <a:off x="944913" y="3577279"/>
-            <a:ext cx="1111914" cy="8924"/>
-          </a:xfrm>
-          <a:prstGeom prst="line">
-            <a:avLst/>
-          </a:prstGeom>
-          <a:ln w="19050">
-            <a:solidFill>
-              <a:schemeClr val="tx1"/>
-            </a:solidFill>
-          </a:ln>
-        </p:spPr>
-        <p:style>
-          <a:lnRef idx="1">
-            <a:schemeClr val="accent1"/>
-          </a:lnRef>
-          <a:fillRef idx="0">
-            <a:schemeClr val="accent1"/>
-          </a:fillRef>
-          <a:effectRef idx="0">
-            <a:schemeClr val="accent1"/>
-          </a:effectRef>
-          <a:fontRef idx="minor">
-            <a:schemeClr val="tx1"/>
-          </a:fontRef>
-        </p:style>
-      </p:cxnSp>
-      <p:sp>
-        <p:nvSpPr>
-          <p:cNvPr id="121" name="Gleichschenkliges Dreieck 120">
-            <a:extLst>
-              <a:ext uri="{FF2B5EF4-FFF2-40B4-BE49-F238E27FC236}">
-                <a16:creationId xmlns:a16="http://schemas.microsoft.com/office/drawing/2014/main" id="{4C7F3838-7432-E7A8-49F8-22C01FECF028}"/>
-              </a:ext>
-            </a:extLst>
-          </p:cNvPr>
-          <p:cNvSpPr/>
-          <p:nvPr/>
-        </p:nvSpPr>
-        <p:spPr>
-          <a:xfrm>
-            <a:off x="943537" y="1142223"/>
+            <a:off x="148902" y="1153730"/>
             <a:ext cx="386648" cy="413201"/>
           </a:xfrm>
           <a:prstGeom prst="triangle">
@@ -9904,12 +10355,100 @@
           </a:p>
         </p:txBody>
       </p:sp>
-      <p:sp>
-        <p:nvSpPr>
-          <p:cNvPr id="125" name="Gleichschenkliges Dreieck 124">
-            <a:extLst>
-              <a:ext uri="{FF2B5EF4-FFF2-40B4-BE49-F238E27FC236}">
-                <a16:creationId xmlns:a16="http://schemas.microsoft.com/office/drawing/2014/main" id="{37A775E3-EDF7-9780-06F7-32B092C8E78A}"/>
+      <p:cxnSp>
+        <p:nvCxnSpPr>
+          <p:cNvPr id="322" name="Gerader Verbinder 321">
+            <a:extLst>
+              <a:ext uri="{FF2B5EF4-FFF2-40B4-BE49-F238E27FC236}">
+                <a16:creationId xmlns:a16="http://schemas.microsoft.com/office/drawing/2014/main" id="{AD95E441-CAA2-83EF-7335-7A09FA0FEC43}"/>
+              </a:ext>
+            </a:extLst>
+          </p:cNvPr>
+          <p:cNvCxnSpPr>
+            <a:cxnSpLocks/>
+            <a:stCxn id="326" idx="0"/>
+            <a:endCxn id="81" idx="4"/>
+          </p:cNvCxnSpPr>
+          <p:nvPr/>
+        </p:nvCxnSpPr>
+        <p:spPr>
+          <a:xfrm flipH="1" flipV="1">
+            <a:off x="950096" y="1153736"/>
+            <a:ext cx="820" cy="432906"/>
+          </a:xfrm>
+          <a:prstGeom prst="line">
+            <a:avLst/>
+          </a:prstGeom>
+          <a:ln w="19050">
+            <a:solidFill>
+              <a:schemeClr val="tx1"/>
+            </a:solidFill>
+          </a:ln>
+        </p:spPr>
+        <p:style>
+          <a:lnRef idx="1">
+            <a:schemeClr val="accent1"/>
+          </a:lnRef>
+          <a:fillRef idx="0">
+            <a:schemeClr val="accent1"/>
+          </a:fillRef>
+          <a:effectRef idx="0">
+            <a:schemeClr val="accent1"/>
+          </a:effectRef>
+          <a:fontRef idx="minor">
+            <a:schemeClr val="tx1"/>
+          </a:fontRef>
+        </p:style>
+      </p:cxnSp>
+      <p:cxnSp>
+        <p:nvCxnSpPr>
+          <p:cNvPr id="325" name="Gerader Verbinder 324">
+            <a:extLst>
+              <a:ext uri="{FF2B5EF4-FFF2-40B4-BE49-F238E27FC236}">
+                <a16:creationId xmlns:a16="http://schemas.microsoft.com/office/drawing/2014/main" id="{01D62E52-246B-01D5-6B22-A971A480402D}"/>
+              </a:ext>
+            </a:extLst>
+          </p:cNvPr>
+          <p:cNvCxnSpPr>
+            <a:cxnSpLocks/>
+          </p:cNvCxnSpPr>
+          <p:nvPr/>
+        </p:nvCxnSpPr>
+        <p:spPr>
+          <a:xfrm>
+            <a:off x="352425" y="1555424"/>
+            <a:ext cx="1173435" cy="0"/>
+          </a:xfrm>
+          <a:prstGeom prst="line">
+            <a:avLst/>
+          </a:prstGeom>
+          <a:ln w="38100" cmpd="sng">
+            <a:solidFill>
+              <a:schemeClr val="tx1"/>
+            </a:solidFill>
+          </a:ln>
+        </p:spPr>
+        <p:style>
+          <a:lnRef idx="1">
+            <a:schemeClr val="accent1"/>
+          </a:lnRef>
+          <a:fillRef idx="0">
+            <a:schemeClr val="accent1"/>
+          </a:fillRef>
+          <a:effectRef idx="0">
+            <a:schemeClr val="accent1"/>
+          </a:effectRef>
+          <a:fontRef idx="minor">
+            <a:schemeClr val="tx1"/>
+          </a:fontRef>
+        </p:style>
+      </p:cxnSp>
+      <p:sp>
+        <p:nvSpPr>
+          <p:cNvPr id="326" name="Gleichschenkliges Dreieck 325">
+            <a:extLst>
+              <a:ext uri="{FF2B5EF4-FFF2-40B4-BE49-F238E27FC236}">
+                <a16:creationId xmlns:a16="http://schemas.microsoft.com/office/drawing/2014/main" id="{E0F61A4D-9CA8-0FC2-871A-12916B5EA346}"/>
               </a:ext>
             </a:extLst>
           </p:cNvPr>
@@ -9918,7 +10457,7 @@
         </p:nvSpPr>
         <p:spPr>
           <a:xfrm>
-            <a:off x="148902" y="1153730"/>
+            <a:off x="757592" y="1586642"/>
             <a:ext cx="386648" cy="413201"/>
           </a:xfrm>
           <a:prstGeom prst="triangle">
@@ -9959,24 +10498,24 @@
       </p:sp>
       <p:cxnSp>
         <p:nvCxnSpPr>
-          <p:cNvPr id="322" name="Gerader Verbinder 321">
-            <a:extLst>
-              <a:ext uri="{FF2B5EF4-FFF2-40B4-BE49-F238E27FC236}">
-                <a16:creationId xmlns:a16="http://schemas.microsoft.com/office/drawing/2014/main" id="{AD95E441-CAA2-83EF-7335-7A09FA0FEC43}"/>
+          <p:cNvPr id="163" name="Gerader Verbinder 162">
+            <a:extLst>
+              <a:ext uri="{FF2B5EF4-FFF2-40B4-BE49-F238E27FC236}">
+                <a16:creationId xmlns:a16="http://schemas.microsoft.com/office/drawing/2014/main" id="{0BCC4C72-5CC3-37D3-F8D1-503AE586161A}"/>
               </a:ext>
             </a:extLst>
           </p:cNvPr>
           <p:cNvCxnSpPr>
             <a:cxnSpLocks/>
-            <a:stCxn id="326" idx="0"/>
-            <a:endCxn id="81" idx="4"/>
+            <a:stCxn id="165" idx="2"/>
+            <a:endCxn id="16" idx="1"/>
           </p:cNvCxnSpPr>
           <p:nvPr/>
         </p:nvCxnSpPr>
         <p:spPr>
-          <a:xfrm flipH="1" flipV="1">
-            <a:off x="950096" y="1153736"/>
-            <a:ext cx="820" cy="432906"/>
+          <a:xfrm>
+            <a:off x="1332886" y="2468438"/>
+            <a:ext cx="240704" cy="0"/>
           </a:xfrm>
           <a:prstGeom prst="line">
             <a:avLst/>
@@ -10002,64 +10541,21 @@
           </a:fontRef>
         </p:style>
       </p:cxnSp>
-      <p:cxnSp>
-        <p:nvCxnSpPr>
-          <p:cNvPr id="325" name="Gerader Verbinder 324">
-            <a:extLst>
-              <a:ext uri="{FF2B5EF4-FFF2-40B4-BE49-F238E27FC236}">
-                <a16:creationId xmlns:a16="http://schemas.microsoft.com/office/drawing/2014/main" id="{01D62E52-246B-01D5-6B22-A971A480402D}"/>
-              </a:ext>
-            </a:extLst>
-          </p:cNvPr>
-          <p:cNvCxnSpPr>
-            <a:cxnSpLocks/>
-          </p:cNvCxnSpPr>
+      <p:sp>
+        <p:nvSpPr>
+          <p:cNvPr id="165" name="Gleichschenkliges Dreieck 164">
+            <a:extLst>
+              <a:ext uri="{FF2B5EF4-FFF2-40B4-BE49-F238E27FC236}">
+                <a16:creationId xmlns:a16="http://schemas.microsoft.com/office/drawing/2014/main" id="{64A71830-C41A-E1D0-DDE2-520004B9FE8F}"/>
+              </a:ext>
+            </a:extLst>
+          </p:cNvPr>
+          <p:cNvSpPr/>
           <p:nvPr/>
-        </p:nvCxnSpPr>
+        </p:nvSpPr>
         <p:spPr>
           <a:xfrm>
-            <a:off x="352425" y="1555424"/>
-            <a:ext cx="1173435" cy="0"/>
-          </a:xfrm>
-          <a:prstGeom prst="line">
-            <a:avLst/>
-          </a:prstGeom>
-          <a:ln w="38100" cmpd="sng">
-            <a:solidFill>
-              <a:schemeClr val="tx1"/>
-            </a:solidFill>
-          </a:ln>
-        </p:spPr>
-        <p:style>
-          <a:lnRef idx="1">
-            <a:schemeClr val="accent1"/>
-          </a:lnRef>
-          <a:fillRef idx="0">
-            <a:schemeClr val="accent1"/>
-          </a:fillRef>
-          <a:effectRef idx="0">
-            <a:schemeClr val="accent1"/>
-          </a:effectRef>
-          <a:fontRef idx="minor">
-            <a:schemeClr val="tx1"/>
-          </a:fontRef>
-        </p:style>
-      </p:cxnSp>
-      <p:sp>
-        <p:nvSpPr>
-          <p:cNvPr id="326" name="Gleichschenkliges Dreieck 325">
-            <a:extLst>
-              <a:ext uri="{FF2B5EF4-FFF2-40B4-BE49-F238E27FC236}">
-                <a16:creationId xmlns:a16="http://schemas.microsoft.com/office/drawing/2014/main" id="{E0F61A4D-9CA8-0FC2-871A-12916B5EA346}"/>
-              </a:ext>
-            </a:extLst>
-          </p:cNvPr>
-          <p:cNvSpPr/>
-          <p:nvPr/>
-        </p:nvSpPr>
-        <p:spPr>
-          <a:xfrm>
-            <a:off x="757592" y="1586642"/>
+            <a:off x="1332886" y="2055237"/>
             <a:ext cx="386648" cy="413201"/>
           </a:xfrm>
           <a:prstGeom prst="triangle">
@@ -10100,104 +10596,6 @@
       </p:sp>
       <p:cxnSp>
         <p:nvCxnSpPr>
-          <p:cNvPr id="163" name="Gerader Verbinder 162">
-            <a:extLst>
-              <a:ext uri="{FF2B5EF4-FFF2-40B4-BE49-F238E27FC236}">
-                <a16:creationId xmlns:a16="http://schemas.microsoft.com/office/drawing/2014/main" id="{0BCC4C72-5CC3-37D3-F8D1-503AE586161A}"/>
-              </a:ext>
-            </a:extLst>
-          </p:cNvPr>
-          <p:cNvCxnSpPr>
-            <a:cxnSpLocks/>
-            <a:stCxn id="165" idx="2"/>
-            <a:endCxn id="16" idx="1"/>
-          </p:cNvCxnSpPr>
-          <p:nvPr/>
-        </p:nvCxnSpPr>
-        <p:spPr>
-          <a:xfrm flipV="1">
-            <a:off x="1332536" y="2468438"/>
-            <a:ext cx="241054" cy="1063"/>
-          </a:xfrm>
-          <a:prstGeom prst="line">
-            <a:avLst/>
-          </a:prstGeom>
-          <a:ln w="19050">
-            <a:solidFill>
-              <a:schemeClr val="tx1"/>
-            </a:solidFill>
-          </a:ln>
-        </p:spPr>
-        <p:style>
-          <a:lnRef idx="1">
-            <a:schemeClr val="accent1"/>
-          </a:lnRef>
-          <a:fillRef idx="0">
-            <a:schemeClr val="accent1"/>
-          </a:fillRef>
-          <a:effectRef idx="0">
-            <a:schemeClr val="accent1"/>
-          </a:effectRef>
-          <a:fontRef idx="minor">
-            <a:schemeClr val="tx1"/>
-          </a:fontRef>
-        </p:style>
-      </p:cxnSp>
-      <p:sp>
-        <p:nvSpPr>
-          <p:cNvPr id="165" name="Gleichschenkliges Dreieck 164">
-            <a:extLst>
-              <a:ext uri="{FF2B5EF4-FFF2-40B4-BE49-F238E27FC236}">
-                <a16:creationId xmlns:a16="http://schemas.microsoft.com/office/drawing/2014/main" id="{64A71830-C41A-E1D0-DDE2-520004B9FE8F}"/>
-              </a:ext>
-            </a:extLst>
-          </p:cNvPr>
-          <p:cNvSpPr/>
-          <p:nvPr/>
-        </p:nvSpPr>
-        <p:spPr>
-          <a:xfrm>
-            <a:off x="1332536" y="2056300"/>
-            <a:ext cx="386648" cy="413201"/>
-          </a:xfrm>
-          <a:prstGeom prst="triangle">
-            <a:avLst/>
-          </a:prstGeom>
-          <a:noFill/>
-          <a:ln>
-            <a:noFill/>
-          </a:ln>
-        </p:spPr>
-        <p:style>
-          <a:lnRef idx="2">
-            <a:schemeClr val="accent1">
-              <a:shade val="15000"/>
-            </a:schemeClr>
-          </a:lnRef>
-          <a:fillRef idx="1">
-            <a:schemeClr val="accent1"/>
-          </a:fillRef>
-          <a:effectRef idx="0">
-            <a:schemeClr val="accent1"/>
-          </a:effectRef>
-          <a:fontRef idx="minor">
-            <a:schemeClr val="lt1"/>
-          </a:fontRef>
-        </p:style>
-        <p:txBody>
-          <a:bodyPr rtlCol="0" anchor="ctr"/>
-          <a:lstStyle/>
-          <a:p>
-            <a:pPr algn="ctr"/>
-            <a:endParaRPr lang="de-DE">
-              <a:latin typeface="Arial" panose="020B0604020202020204" pitchFamily="34" charset="0"/>
-              <a:cs typeface="Arial" panose="020B0604020202020204" pitchFamily="34" charset="0"/>
-            </a:endParaRPr>
-          </a:p>
-        </p:txBody>
-      </p:sp>
-      <p:cxnSp>
-        <p:nvCxnSpPr>
           <p:cNvPr id="170" name="Gerader Verbinder 169">
             <a:extLst>
               <a:ext uri="{FF2B5EF4-FFF2-40B4-BE49-F238E27FC236}">
@@ -10254,15 +10652,15 @@
           </p:cNvPr>
           <p:cNvCxnSpPr>
             <a:cxnSpLocks/>
-            <a:stCxn id="121" idx="2"/>
-            <a:endCxn id="106" idx="2"/>
+            <a:stCxn id="16" idx="2"/>
+            <a:endCxn id="23" idx="0"/>
           </p:cNvCxnSpPr>
           <p:nvPr/>
         </p:nvCxnSpPr>
         <p:spPr>
           <a:xfrm>
-            <a:off x="943537" y="1555424"/>
-            <a:ext cx="1376" cy="2021855"/>
+            <a:off x="2806648" y="2675038"/>
+            <a:ext cx="3707" cy="704564"/>
           </a:xfrm>
           <a:prstGeom prst="line">
             <a:avLst/>
@@ -10309,7 +10707,7 @@
         <p:spPr>
           <a:xfrm>
             <a:off x="1330185" y="1555424"/>
-            <a:ext cx="2351" cy="914077"/>
+            <a:ext cx="2701" cy="913014"/>
           </a:xfrm>
           <a:prstGeom prst="line">
             <a:avLst/>

</xml_diff>